<commit_message>
Modified the diagram to include the Yelb demo application
</commit_message>
<xml_diff>
--- a/ekstender.pptx
+++ b/ekstender.pptx
@@ -197,7 +197,7 @@
           <a:p>
             <a:fld id="{B6707FB1-E1F5-C240-9110-0150C7F6B965}" type="datetimeFigureOut">
               <a:rPr lang="en-US" smtClean="0"/>
-              <a:t>4/4/19</a:t>
+              <a:t>4/10/19</a:t>
             </a:fld>
             <a:endParaRPr lang="en-US"/>
           </a:p>
@@ -695,7 +695,7 @@
           <a:p>
             <a:fld id="{DF731274-5EC7-294F-BC8D-4FC9B8426EBA}" type="datetimeFigureOut">
               <a:rPr lang="en-US" smtClean="0"/>
-              <a:t>4/4/19</a:t>
+              <a:t>4/10/19</a:t>
             </a:fld>
             <a:endParaRPr lang="en-US"/>
           </a:p>
@@ -893,7 +893,7 @@
           <a:p>
             <a:fld id="{DF731274-5EC7-294F-BC8D-4FC9B8426EBA}" type="datetimeFigureOut">
               <a:rPr lang="en-US" smtClean="0"/>
-              <a:t>4/4/19</a:t>
+              <a:t>4/10/19</a:t>
             </a:fld>
             <a:endParaRPr lang="en-US"/>
           </a:p>
@@ -1101,7 +1101,7 @@
           <a:p>
             <a:fld id="{DF731274-5EC7-294F-BC8D-4FC9B8426EBA}" type="datetimeFigureOut">
               <a:rPr lang="en-US" smtClean="0"/>
-              <a:t>4/4/19</a:t>
+              <a:t>4/10/19</a:t>
             </a:fld>
             <a:endParaRPr lang="en-US"/>
           </a:p>
@@ -1299,7 +1299,7 @@
           <a:p>
             <a:fld id="{DF731274-5EC7-294F-BC8D-4FC9B8426EBA}" type="datetimeFigureOut">
               <a:rPr lang="en-US" smtClean="0"/>
-              <a:t>4/4/19</a:t>
+              <a:t>4/10/19</a:t>
             </a:fld>
             <a:endParaRPr lang="en-US"/>
           </a:p>
@@ -1574,7 +1574,7 @@
           <a:p>
             <a:fld id="{DF731274-5EC7-294F-BC8D-4FC9B8426EBA}" type="datetimeFigureOut">
               <a:rPr lang="en-US" smtClean="0"/>
-              <a:t>4/4/19</a:t>
+              <a:t>4/10/19</a:t>
             </a:fld>
             <a:endParaRPr lang="en-US"/>
           </a:p>
@@ -1839,7 +1839,7 @@
           <a:p>
             <a:fld id="{DF731274-5EC7-294F-BC8D-4FC9B8426EBA}" type="datetimeFigureOut">
               <a:rPr lang="en-US" smtClean="0"/>
-              <a:t>4/4/19</a:t>
+              <a:t>4/10/19</a:t>
             </a:fld>
             <a:endParaRPr lang="en-US"/>
           </a:p>
@@ -2251,7 +2251,7 @@
           <a:p>
             <a:fld id="{DF731274-5EC7-294F-BC8D-4FC9B8426EBA}" type="datetimeFigureOut">
               <a:rPr lang="en-US" smtClean="0"/>
-              <a:t>4/4/19</a:t>
+              <a:t>4/10/19</a:t>
             </a:fld>
             <a:endParaRPr lang="en-US"/>
           </a:p>
@@ -2392,7 +2392,7 @@
           <a:p>
             <a:fld id="{DF731274-5EC7-294F-BC8D-4FC9B8426EBA}" type="datetimeFigureOut">
               <a:rPr lang="en-US" smtClean="0"/>
-              <a:t>4/4/19</a:t>
+              <a:t>4/10/19</a:t>
             </a:fld>
             <a:endParaRPr lang="en-US"/>
           </a:p>
@@ -2505,7 +2505,7 @@
           <a:p>
             <a:fld id="{DF731274-5EC7-294F-BC8D-4FC9B8426EBA}" type="datetimeFigureOut">
               <a:rPr lang="en-US" smtClean="0"/>
-              <a:t>4/4/19</a:t>
+              <a:t>4/10/19</a:t>
             </a:fld>
             <a:endParaRPr lang="en-US"/>
           </a:p>
@@ -2816,7 +2816,7 @@
           <a:p>
             <a:fld id="{DF731274-5EC7-294F-BC8D-4FC9B8426EBA}" type="datetimeFigureOut">
               <a:rPr lang="en-US" smtClean="0"/>
-              <a:t>4/4/19</a:t>
+              <a:t>4/10/19</a:t>
             </a:fld>
             <a:endParaRPr lang="en-US"/>
           </a:p>
@@ -3104,7 +3104,7 @@
           <a:p>
             <a:fld id="{DF731274-5EC7-294F-BC8D-4FC9B8426EBA}" type="datetimeFigureOut">
               <a:rPr lang="en-US" smtClean="0"/>
-              <a:t>4/4/19</a:t>
+              <a:t>4/10/19</a:t>
             </a:fld>
             <a:endParaRPr lang="en-US"/>
           </a:p>
@@ -3345,7 +3345,7 @@
           <a:p>
             <a:fld id="{DF731274-5EC7-294F-BC8D-4FC9B8426EBA}" type="datetimeFigureOut">
               <a:rPr lang="en-US" smtClean="0"/>
-              <a:t>4/4/19</a:t>
+              <a:t>4/10/19</a:t>
             </a:fld>
             <a:endParaRPr lang="en-US"/>
           </a:p>
@@ -4809,10 +4809,11 @@
           <a:prstGeom prst="roundRect">
             <a:avLst/>
           </a:prstGeom>
-          <a:noFill/>
-          <a:ln>
-            <a:prstDash val="sysDash"/>
-          </a:ln>
+          <a:solidFill>
+            <a:schemeClr val="accent6">
+              <a:lumMod val="75000"/>
+            </a:schemeClr>
+          </a:solidFill>
         </p:spPr>
         <p:style>
           <a:lnRef idx="2">
@@ -4835,11 +4836,14 @@
           <a:lstStyle/>
           <a:p>
             <a:pPr algn="ctr"/>
-            <a:endParaRPr lang="en-US" sz="1600" b="1" i="1" dirty="0">
-              <a:solidFill>
-                <a:schemeClr val="bg1"/>
-              </a:solidFill>
-            </a:endParaRPr>
+            <a:r>
+              <a:rPr lang="en-US" sz="1600" b="1" i="1" dirty="0">
+                <a:solidFill>
+                  <a:schemeClr val="bg1"/>
+                </a:solidFill>
+              </a:rPr>
+              <a:t>Yelb</a:t>
+            </a:r>
           </a:p>
         </p:txBody>
       </p:sp>
@@ -4980,6 +4984,116 @@
             <a:r>
               <a:rPr lang="en-US" dirty="0"/>
               <a:t>Laptop</a:t>
+            </a:r>
+          </a:p>
+        </p:txBody>
+      </p:sp>
+      <p:cxnSp>
+        <p:nvCxnSpPr>
+          <p:cNvPr id="31" name="Straight Arrow Connector 30">
+            <a:extLst>
+              <a:ext uri="{FF2B5EF4-FFF2-40B4-BE49-F238E27FC236}">
+                <a16:creationId xmlns:a16="http://schemas.microsoft.com/office/drawing/2014/main" id="{515E6AC3-EE35-6D49-890D-5ECBA150A5CC}"/>
+              </a:ext>
+            </a:extLst>
+          </p:cNvPr>
+          <p:cNvCxnSpPr>
+            <a:cxnSpLocks/>
+            <a:endCxn id="32" idx="2"/>
+          </p:cNvCxnSpPr>
+          <p:nvPr/>
+        </p:nvCxnSpPr>
+        <p:spPr>
+          <a:xfrm flipH="1" flipV="1">
+            <a:off x="10684974" y="1278312"/>
+            <a:ext cx="1605" cy="1720001"/>
+          </a:xfrm>
+          <a:prstGeom prst="straightConnector1">
+            <a:avLst/>
+          </a:prstGeom>
+          <a:ln w="38100">
+            <a:solidFill>
+              <a:schemeClr val="tx1"/>
+            </a:solidFill>
+            <a:tailEnd type="triangle"/>
+          </a:ln>
+        </p:spPr>
+        <p:style>
+          <a:lnRef idx="1">
+            <a:schemeClr val="accent1"/>
+          </a:lnRef>
+          <a:fillRef idx="0">
+            <a:schemeClr val="accent1"/>
+          </a:fillRef>
+          <a:effectRef idx="0">
+            <a:schemeClr val="accent1"/>
+          </a:effectRef>
+          <a:fontRef idx="minor">
+            <a:schemeClr val="tx1"/>
+          </a:fontRef>
+        </p:style>
+      </p:cxnSp>
+      <p:pic>
+        <p:nvPicPr>
+          <p:cNvPr id="32" name="Picture 31">
+            <a:extLst>
+              <a:ext uri="{FF2B5EF4-FFF2-40B4-BE49-F238E27FC236}">
+                <a16:creationId xmlns:a16="http://schemas.microsoft.com/office/drawing/2014/main" id="{8313F73F-77B5-D540-8E06-2AEFB7FA0C30}"/>
+              </a:ext>
+            </a:extLst>
+          </p:cNvPr>
+          <p:cNvPicPr>
+            <a:picLocks noChangeAspect="1"/>
+          </p:cNvPicPr>
+          <p:nvPr/>
+        </p:nvPicPr>
+        <p:blipFill>
+          <a:blip r:embed="rId5"/>
+          <a:stretch>
+            <a:fillRect/>
+          </a:stretch>
+        </p:blipFill>
+        <p:spPr>
+          <a:xfrm>
+            <a:off x="10364241" y="659223"/>
+            <a:ext cx="641466" cy="619089"/>
+          </a:xfrm>
+          <a:prstGeom prst="rect">
+            <a:avLst/>
+          </a:prstGeom>
+        </p:spPr>
+      </p:pic>
+      <p:sp>
+        <p:nvSpPr>
+          <p:cNvPr id="34" name="TextBox 33">
+            <a:extLst>
+              <a:ext uri="{FF2B5EF4-FFF2-40B4-BE49-F238E27FC236}">
+                <a16:creationId xmlns:a16="http://schemas.microsoft.com/office/drawing/2014/main" id="{792DCBC4-8172-C34E-9064-7783423A8F09}"/>
+              </a:ext>
+            </a:extLst>
+          </p:cNvPr>
+          <p:cNvSpPr txBox="1"/>
+          <p:nvPr/>
+        </p:nvSpPr>
+        <p:spPr>
+          <a:xfrm>
+            <a:off x="10019695" y="360315"/>
+            <a:ext cx="1351396" cy="369332"/>
+          </a:xfrm>
+          <a:prstGeom prst="rect">
+            <a:avLst/>
+          </a:prstGeom>
+          <a:noFill/>
+        </p:spPr>
+        <p:txBody>
+          <a:bodyPr wrap="none" rtlCol="0">
+            <a:spAutoFit/>
+          </a:bodyPr>
+          <a:lstStyle/>
+          <a:p>
+            <a:r>
+              <a:rPr lang="en-US" dirty="0"/>
+              <a:t>Amazon ALB</a:t>
             </a:r>
           </a:p>
         </p:txBody>

</xml_diff>

<commit_message>
Tweaked the main script and added metric server (for HPA) as well as CA. Also added the experimental cleaner script
</commit_message>
<xml_diff>
--- a/ekstender.pptx
+++ b/ekstender.pptx
@@ -197,7 +197,7 @@
           <a:p>
             <a:fld id="{B6707FB1-E1F5-C240-9110-0150C7F6B965}" type="datetimeFigureOut">
               <a:rPr lang="en-US" smtClean="0"/>
-              <a:t>4/10/19</a:t>
+              <a:t>6/4/19</a:t>
             </a:fld>
             <a:endParaRPr lang="en-US"/>
           </a:p>
@@ -695,7 +695,7 @@
           <a:p>
             <a:fld id="{DF731274-5EC7-294F-BC8D-4FC9B8426EBA}" type="datetimeFigureOut">
               <a:rPr lang="en-US" smtClean="0"/>
-              <a:t>4/10/19</a:t>
+              <a:t>6/4/19</a:t>
             </a:fld>
             <a:endParaRPr lang="en-US"/>
           </a:p>
@@ -893,7 +893,7 @@
           <a:p>
             <a:fld id="{DF731274-5EC7-294F-BC8D-4FC9B8426EBA}" type="datetimeFigureOut">
               <a:rPr lang="en-US" smtClean="0"/>
-              <a:t>4/10/19</a:t>
+              <a:t>6/4/19</a:t>
             </a:fld>
             <a:endParaRPr lang="en-US"/>
           </a:p>
@@ -1101,7 +1101,7 @@
           <a:p>
             <a:fld id="{DF731274-5EC7-294F-BC8D-4FC9B8426EBA}" type="datetimeFigureOut">
               <a:rPr lang="en-US" smtClean="0"/>
-              <a:t>4/10/19</a:t>
+              <a:t>6/4/19</a:t>
             </a:fld>
             <a:endParaRPr lang="en-US"/>
           </a:p>
@@ -1299,7 +1299,7 @@
           <a:p>
             <a:fld id="{DF731274-5EC7-294F-BC8D-4FC9B8426EBA}" type="datetimeFigureOut">
               <a:rPr lang="en-US" smtClean="0"/>
-              <a:t>4/10/19</a:t>
+              <a:t>6/4/19</a:t>
             </a:fld>
             <a:endParaRPr lang="en-US"/>
           </a:p>
@@ -1574,7 +1574,7 @@
           <a:p>
             <a:fld id="{DF731274-5EC7-294F-BC8D-4FC9B8426EBA}" type="datetimeFigureOut">
               <a:rPr lang="en-US" smtClean="0"/>
-              <a:t>4/10/19</a:t>
+              <a:t>6/4/19</a:t>
             </a:fld>
             <a:endParaRPr lang="en-US"/>
           </a:p>
@@ -1839,7 +1839,7 @@
           <a:p>
             <a:fld id="{DF731274-5EC7-294F-BC8D-4FC9B8426EBA}" type="datetimeFigureOut">
               <a:rPr lang="en-US" smtClean="0"/>
-              <a:t>4/10/19</a:t>
+              <a:t>6/4/19</a:t>
             </a:fld>
             <a:endParaRPr lang="en-US"/>
           </a:p>
@@ -2251,7 +2251,7 @@
           <a:p>
             <a:fld id="{DF731274-5EC7-294F-BC8D-4FC9B8426EBA}" type="datetimeFigureOut">
               <a:rPr lang="en-US" smtClean="0"/>
-              <a:t>4/10/19</a:t>
+              <a:t>6/4/19</a:t>
             </a:fld>
             <a:endParaRPr lang="en-US"/>
           </a:p>
@@ -2392,7 +2392,7 @@
           <a:p>
             <a:fld id="{DF731274-5EC7-294F-BC8D-4FC9B8426EBA}" type="datetimeFigureOut">
               <a:rPr lang="en-US" smtClean="0"/>
-              <a:t>4/10/19</a:t>
+              <a:t>6/4/19</a:t>
             </a:fld>
             <a:endParaRPr lang="en-US"/>
           </a:p>
@@ -2505,7 +2505,7 @@
           <a:p>
             <a:fld id="{DF731274-5EC7-294F-BC8D-4FC9B8426EBA}" type="datetimeFigureOut">
               <a:rPr lang="en-US" smtClean="0"/>
-              <a:t>4/10/19</a:t>
+              <a:t>6/4/19</a:t>
             </a:fld>
             <a:endParaRPr lang="en-US"/>
           </a:p>
@@ -2816,7 +2816,7 @@
           <a:p>
             <a:fld id="{DF731274-5EC7-294F-BC8D-4FC9B8426EBA}" type="datetimeFigureOut">
               <a:rPr lang="en-US" smtClean="0"/>
-              <a:t>4/10/19</a:t>
+              <a:t>6/4/19</a:t>
             </a:fld>
             <a:endParaRPr lang="en-US"/>
           </a:p>
@@ -3104,7 +3104,7 @@
           <a:p>
             <a:fld id="{DF731274-5EC7-294F-BC8D-4FC9B8426EBA}" type="datetimeFigureOut">
               <a:rPr lang="en-US" smtClean="0"/>
-              <a:t>4/10/19</a:t>
+              <a:t>6/4/19</a:t>
             </a:fld>
             <a:endParaRPr lang="en-US"/>
           </a:p>
@@ -3345,7 +3345,7 @@
           <a:p>
             <a:fld id="{DF731274-5EC7-294F-BC8D-4FC9B8426EBA}" type="datetimeFigureOut">
               <a:rPr lang="en-US" smtClean="0"/>
-              <a:t>4/10/19</a:t>
+              <a:t>6/4/19</a:t>
             </a:fld>
             <a:endParaRPr lang="en-US"/>
           </a:p>
@@ -3974,14 +3974,14 @@
           <a:p>
             <a:pPr algn="ctr"/>
             <a:r>
-              <a:rPr lang="en-US" sz="1600" b="1" i="1" dirty="0">
+              <a:rPr lang="en-US" sz="1400" b="1" i="1" dirty="0">
                 <a:solidFill>
                   <a:schemeClr val="tx1"/>
                 </a:solidFill>
               </a:rPr>
               <a:t>Calico</a:t>
             </a:r>
-            <a:endParaRPr lang="en-US" b="1" i="1" dirty="0">
+            <a:endParaRPr lang="en-US" sz="1600" b="1" i="1" dirty="0">
               <a:solidFill>
                 <a:schemeClr val="tx1"/>
               </a:solidFill>
@@ -4037,7 +4037,7 @@
           <a:p>
             <a:pPr algn="ctr"/>
             <a:r>
-              <a:rPr lang="en-US" sz="1600" b="1" i="1" dirty="0">
+              <a:rPr lang="en-US" sz="1400" b="1" i="1" dirty="0">
                 <a:solidFill>
                   <a:schemeClr val="tx1"/>
                 </a:solidFill>
@@ -4093,7 +4093,7 @@
           <a:p>
             <a:pPr algn="ctr"/>
             <a:r>
-              <a:rPr lang="en-US" sz="1600" b="1" i="1" dirty="0">
+              <a:rPr lang="en-US" sz="1400" b="1" i="1" dirty="0">
                 <a:solidFill>
                   <a:schemeClr val="tx1"/>
                 </a:solidFill>
@@ -4152,7 +4152,7 @@
           <a:p>
             <a:pPr algn="ctr"/>
             <a:r>
-              <a:rPr lang="en-US" sz="1600" b="1" i="1" dirty="0">
+              <a:rPr lang="en-US" sz="1400" b="1" i="1" dirty="0">
                 <a:solidFill>
                   <a:schemeClr val="tx1"/>
                 </a:solidFill>
@@ -4176,7 +4176,7 @@
         </p:nvSpPr>
         <p:spPr>
           <a:xfrm>
-            <a:off x="6456941" y="2998313"/>
+            <a:off x="6456941" y="2472533"/>
             <a:ext cx="1620253" cy="433137"/>
           </a:xfrm>
           <a:prstGeom prst="roundRect">
@@ -4211,7 +4211,7 @@
           <a:p>
             <a:pPr algn="ctr"/>
             <a:r>
-              <a:rPr lang="en-US" sz="1600" b="1" i="1" dirty="0">
+              <a:rPr lang="en-US" sz="1400" b="1" i="1" dirty="0">
                 <a:solidFill>
                   <a:schemeClr val="tx1"/>
                 </a:solidFill>
@@ -4235,7 +4235,7 @@
         </p:nvSpPr>
         <p:spPr>
           <a:xfrm>
-            <a:off x="4728404" y="2998313"/>
+            <a:off x="4728404" y="2472533"/>
             <a:ext cx="1620253" cy="433137"/>
           </a:xfrm>
           <a:prstGeom prst="roundRect">
@@ -4269,7 +4269,7 @@
           <a:p>
             <a:pPr algn="ctr"/>
             <a:r>
-              <a:rPr lang="en-US" sz="1600" b="1" i="1" dirty="0">
+              <a:rPr lang="en-US" sz="1400" b="1" i="1" dirty="0">
                 <a:solidFill>
                   <a:schemeClr val="bg1"/>
                 </a:solidFill>
@@ -4293,7 +4293,7 @@
         </p:nvSpPr>
         <p:spPr>
           <a:xfrm>
-            <a:off x="8185478" y="3001274"/>
+            <a:off x="8185478" y="2475494"/>
             <a:ext cx="1620253" cy="433137"/>
           </a:xfrm>
           <a:prstGeom prst="roundRect">
@@ -4325,7 +4325,7 @@
           <a:p>
             <a:pPr algn="ctr"/>
             <a:r>
-              <a:rPr lang="en-US" sz="1600" b="1" i="1" dirty="0">
+              <a:rPr lang="en-US" sz="1400" b="1" i="1" dirty="0">
                 <a:solidFill>
                   <a:schemeClr val="bg1"/>
                 </a:solidFill>
@@ -4458,8 +4458,8 @@
         </p:nvSpPr>
         <p:spPr>
           <a:xfrm>
-            <a:off x="4571993" y="2875554"/>
-            <a:ext cx="7038474" cy="1239252"/>
+            <a:off x="4571993" y="2301918"/>
+            <a:ext cx="7038474" cy="1812888"/>
           </a:xfrm>
           <a:prstGeom prst="roundRect">
             <a:avLst/>
@@ -4607,12 +4607,12 @@
         </p:nvCxnSpPr>
         <p:spPr>
           <a:xfrm rot="10800000" flipH="1">
-            <a:off x="685799" y="3495180"/>
-            <a:ext cx="3886193" cy="815394"/>
+            <a:off x="685799" y="3208362"/>
+            <a:ext cx="3886193" cy="1102212"/>
           </a:xfrm>
           <a:prstGeom prst="bentConnector3">
             <a:avLst>
-              <a:gd name="adj1" fmla="val -10836"/>
+              <a:gd name="adj1" fmla="val -5882"/>
             </a:avLst>
           </a:prstGeom>
           <a:ln w="19050">
@@ -4656,7 +4656,7 @@
         <p:spPr>
           <a:xfrm flipH="1" flipV="1">
             <a:off x="5538530" y="1278313"/>
-            <a:ext cx="1" cy="1720000"/>
+            <a:ext cx="1" cy="1194220"/>
           </a:xfrm>
           <a:prstGeom prst="straightConnector1">
             <a:avLst/>
@@ -4702,7 +4702,7 @@
         <p:spPr>
           <a:xfrm flipH="1" flipV="1">
             <a:off x="7265463" y="1278312"/>
-            <a:ext cx="1605" cy="1720001"/>
+            <a:ext cx="1605" cy="1194221"/>
           </a:xfrm>
           <a:prstGeom prst="straightConnector1">
             <a:avLst/>
@@ -4803,7 +4803,7 @@
         </p:nvSpPr>
         <p:spPr>
           <a:xfrm>
-            <a:off x="9914014" y="3002653"/>
+            <a:off x="9914014" y="2476873"/>
             <a:ext cx="1620253" cy="433137"/>
           </a:xfrm>
           <a:prstGeom prst="roundRect">
@@ -4837,7 +4837,7 @@
           <a:p>
             <a:pPr algn="ctr"/>
             <a:r>
-              <a:rPr lang="en-US" sz="1600" b="1" i="1" dirty="0">
+              <a:rPr lang="en-US" sz="1400" b="1" i="1" dirty="0">
                 <a:solidFill>
                   <a:schemeClr val="bg1"/>
                 </a:solidFill>
@@ -4999,14 +4999,15 @@
           </p:cNvPr>
           <p:cNvCxnSpPr>
             <a:cxnSpLocks/>
+            <a:stCxn id="64" idx="0"/>
             <a:endCxn id="32" idx="2"/>
           </p:cNvCxnSpPr>
           <p:nvPr/>
         </p:nvCxnSpPr>
         <p:spPr>
           <a:xfrm flipH="1" flipV="1">
-            <a:off x="10684974" y="1278312"/>
-            <a:ext cx="1605" cy="1720001"/>
+            <a:off x="10719264" y="1278312"/>
+            <a:ext cx="4877" cy="1198561"/>
           </a:xfrm>
           <a:prstGeom prst="straightConnector1">
             <a:avLst/>
@@ -5055,7 +5056,7 @@
         </p:blipFill>
         <p:spPr>
           <a:xfrm>
-            <a:off x="10364241" y="659223"/>
+            <a:off x="10398531" y="659223"/>
             <a:ext cx="641466" cy="619089"/>
           </a:xfrm>
           <a:prstGeom prst="rect">
@@ -5077,7 +5078,7 @@
         </p:nvSpPr>
         <p:spPr>
           <a:xfrm>
-            <a:off x="10019695" y="360315"/>
+            <a:off x="10053985" y="360315"/>
             <a:ext cx="1351396" cy="369332"/>
           </a:xfrm>
           <a:prstGeom prst="rect">
@@ -5094,6 +5095,337 @@
             <a:r>
               <a:rPr lang="en-US" dirty="0"/>
               <a:t>Amazon ALB</a:t>
+            </a:r>
+          </a:p>
+        </p:txBody>
+      </p:sp>
+      <p:sp>
+        <p:nvSpPr>
+          <p:cNvPr id="35" name="Rounded Rectangle 34">
+            <a:extLst>
+              <a:ext uri="{FF2B5EF4-FFF2-40B4-BE49-F238E27FC236}">
+                <a16:creationId xmlns:a16="http://schemas.microsoft.com/office/drawing/2014/main" id="{03D70019-D357-5543-9770-6E78CEB9B6A4}"/>
+              </a:ext>
+            </a:extLst>
+          </p:cNvPr>
+          <p:cNvSpPr/>
+          <p:nvPr/>
+        </p:nvSpPr>
+        <p:spPr>
+          <a:xfrm>
+            <a:off x="6456941" y="2991525"/>
+            <a:ext cx="1620253" cy="433137"/>
+          </a:xfrm>
+          <a:prstGeom prst="roundRect">
+            <a:avLst/>
+          </a:prstGeom>
+          <a:solidFill>
+            <a:schemeClr val="accent6">
+              <a:lumMod val="40000"/>
+              <a:lumOff val="60000"/>
+            </a:schemeClr>
+          </a:solidFill>
+        </p:spPr>
+        <p:style>
+          <a:lnRef idx="2">
+            <a:schemeClr val="accent1">
+              <a:shade val="50000"/>
+            </a:schemeClr>
+          </a:lnRef>
+          <a:fillRef idx="1">
+            <a:schemeClr val="accent1"/>
+          </a:fillRef>
+          <a:effectRef idx="0">
+            <a:schemeClr val="accent1"/>
+          </a:effectRef>
+          <a:fontRef idx="minor">
+            <a:schemeClr val="lt1"/>
+          </a:fontRef>
+        </p:style>
+        <p:txBody>
+          <a:bodyPr rtlCol="0" anchor="ctr"/>
+          <a:lstStyle/>
+          <a:p>
+            <a:pPr algn="ctr"/>
+            <a:r>
+              <a:rPr lang="en-US" sz="1400" b="1" i="1" dirty="0">
+                <a:solidFill>
+                  <a:schemeClr val="tx1"/>
+                </a:solidFill>
+              </a:rPr>
+              <a:t>Metric Server</a:t>
+            </a:r>
+          </a:p>
+        </p:txBody>
+      </p:sp>
+      <p:sp>
+        <p:nvSpPr>
+          <p:cNvPr id="37" name="Rounded Rectangle 36">
+            <a:extLst>
+              <a:ext uri="{FF2B5EF4-FFF2-40B4-BE49-F238E27FC236}">
+                <a16:creationId xmlns:a16="http://schemas.microsoft.com/office/drawing/2014/main" id="{4C005782-F935-674B-933F-42EE1ECD90F5}"/>
+              </a:ext>
+            </a:extLst>
+          </p:cNvPr>
+          <p:cNvSpPr/>
+          <p:nvPr/>
+        </p:nvSpPr>
+        <p:spPr>
+          <a:xfrm>
+            <a:off x="4728404" y="2991525"/>
+            <a:ext cx="1620253" cy="433137"/>
+          </a:xfrm>
+          <a:prstGeom prst="roundRect">
+            <a:avLst/>
+          </a:prstGeom>
+          <a:noFill/>
+        </p:spPr>
+        <p:style>
+          <a:lnRef idx="2">
+            <a:schemeClr val="accent1">
+              <a:shade val="50000"/>
+            </a:schemeClr>
+          </a:lnRef>
+          <a:fillRef idx="1">
+            <a:schemeClr val="accent1"/>
+          </a:fillRef>
+          <a:effectRef idx="0">
+            <a:schemeClr val="accent1"/>
+          </a:effectRef>
+          <a:fontRef idx="minor">
+            <a:schemeClr val="lt1"/>
+          </a:fontRef>
+        </p:style>
+        <p:txBody>
+          <a:bodyPr rtlCol="0" anchor="ctr"/>
+          <a:lstStyle/>
+          <a:p>
+            <a:pPr algn="ctr"/>
+            <a:endParaRPr lang="en-US" sz="1400" b="1" i="1" dirty="0">
+              <a:solidFill>
+                <a:schemeClr val="bg1"/>
+              </a:solidFill>
+            </a:endParaRPr>
+          </a:p>
+        </p:txBody>
+      </p:sp>
+      <p:sp>
+        <p:nvSpPr>
+          <p:cNvPr id="38" name="Rounded Rectangle 37">
+            <a:extLst>
+              <a:ext uri="{FF2B5EF4-FFF2-40B4-BE49-F238E27FC236}">
+                <a16:creationId xmlns:a16="http://schemas.microsoft.com/office/drawing/2014/main" id="{4369FDF4-9960-F147-865B-1D38473FAAB2}"/>
+              </a:ext>
+            </a:extLst>
+          </p:cNvPr>
+          <p:cNvSpPr/>
+          <p:nvPr/>
+        </p:nvSpPr>
+        <p:spPr>
+          <a:xfrm>
+            <a:off x="8185478" y="2994486"/>
+            <a:ext cx="1620253" cy="433137"/>
+          </a:xfrm>
+          <a:prstGeom prst="roundRect">
+            <a:avLst/>
+          </a:prstGeom>
+          <a:solidFill>
+            <a:schemeClr val="accent5">
+              <a:lumMod val="20000"/>
+              <a:lumOff val="80000"/>
+            </a:schemeClr>
+          </a:solidFill>
+        </p:spPr>
+        <p:style>
+          <a:lnRef idx="2">
+            <a:schemeClr val="accent1">
+              <a:shade val="50000"/>
+            </a:schemeClr>
+          </a:lnRef>
+          <a:fillRef idx="1">
+            <a:schemeClr val="accent1"/>
+          </a:fillRef>
+          <a:effectRef idx="0">
+            <a:schemeClr val="accent1"/>
+          </a:effectRef>
+          <a:fontRef idx="minor">
+            <a:schemeClr val="lt1"/>
+          </a:fontRef>
+        </p:style>
+        <p:txBody>
+          <a:bodyPr rtlCol="0" anchor="ctr"/>
+          <a:lstStyle/>
+          <a:p>
+            <a:pPr algn="ctr"/>
+            <a:r>
+              <a:rPr lang="en-US" sz="1400" b="1" i="1" dirty="0">
+                <a:solidFill>
+                  <a:schemeClr val="tx1"/>
+                </a:solidFill>
+              </a:rPr>
+              <a:t>Cluster Autoscaler</a:t>
+            </a:r>
+          </a:p>
+        </p:txBody>
+      </p:sp>
+      <p:sp>
+        <p:nvSpPr>
+          <p:cNvPr id="39" name="Rounded Rectangle 38">
+            <a:extLst>
+              <a:ext uri="{FF2B5EF4-FFF2-40B4-BE49-F238E27FC236}">
+                <a16:creationId xmlns:a16="http://schemas.microsoft.com/office/drawing/2014/main" id="{A745826B-C5E3-E040-8403-63E77BAC3003}"/>
+              </a:ext>
+            </a:extLst>
+          </p:cNvPr>
+          <p:cNvSpPr/>
+          <p:nvPr/>
+        </p:nvSpPr>
+        <p:spPr>
+          <a:xfrm>
+            <a:off x="9914014" y="2995865"/>
+            <a:ext cx="1620253" cy="433137"/>
+          </a:xfrm>
+          <a:prstGeom prst="roundRect">
+            <a:avLst/>
+          </a:prstGeom>
+          <a:noFill/>
+        </p:spPr>
+        <p:style>
+          <a:lnRef idx="2">
+            <a:schemeClr val="accent1">
+              <a:shade val="50000"/>
+            </a:schemeClr>
+          </a:lnRef>
+          <a:fillRef idx="1">
+            <a:schemeClr val="accent1"/>
+          </a:fillRef>
+          <a:effectRef idx="0">
+            <a:schemeClr val="accent1"/>
+          </a:effectRef>
+          <a:fontRef idx="minor">
+            <a:schemeClr val="lt1"/>
+          </a:fontRef>
+        </p:style>
+        <p:txBody>
+          <a:bodyPr rtlCol="0" anchor="ctr"/>
+          <a:lstStyle/>
+          <a:p>
+            <a:pPr algn="ctr"/>
+            <a:endParaRPr lang="en-US" sz="1400" b="1" i="1" dirty="0">
+              <a:solidFill>
+                <a:schemeClr val="bg1"/>
+              </a:solidFill>
+            </a:endParaRPr>
+          </a:p>
+        </p:txBody>
+      </p:sp>
+      <p:cxnSp>
+        <p:nvCxnSpPr>
+          <p:cNvPr id="40" name="Straight Arrow Connector 39">
+            <a:extLst>
+              <a:ext uri="{FF2B5EF4-FFF2-40B4-BE49-F238E27FC236}">
+                <a16:creationId xmlns:a16="http://schemas.microsoft.com/office/drawing/2014/main" id="{D3811362-B1C4-7941-BB4F-211B75C08AF5}"/>
+              </a:ext>
+            </a:extLst>
+          </p:cNvPr>
+          <p:cNvCxnSpPr>
+            <a:cxnSpLocks/>
+            <a:stCxn id="15" idx="0"/>
+            <a:endCxn id="41" idx="2"/>
+          </p:cNvCxnSpPr>
+          <p:nvPr/>
+        </p:nvCxnSpPr>
+        <p:spPr>
+          <a:xfrm flipH="1" flipV="1">
+            <a:off x="8993285" y="1283045"/>
+            <a:ext cx="2320" cy="1192449"/>
+          </a:xfrm>
+          <a:prstGeom prst="straightConnector1">
+            <a:avLst/>
+          </a:prstGeom>
+          <a:ln w="38100">
+            <a:solidFill>
+              <a:schemeClr val="tx1"/>
+            </a:solidFill>
+            <a:tailEnd type="triangle"/>
+          </a:ln>
+        </p:spPr>
+        <p:style>
+          <a:lnRef idx="1">
+            <a:schemeClr val="accent1"/>
+          </a:lnRef>
+          <a:fillRef idx="0">
+            <a:schemeClr val="accent1"/>
+          </a:fillRef>
+          <a:effectRef idx="0">
+            <a:schemeClr val="accent1"/>
+          </a:effectRef>
+          <a:fontRef idx="minor">
+            <a:schemeClr val="tx1"/>
+          </a:fontRef>
+        </p:style>
+      </p:cxnSp>
+      <p:pic>
+        <p:nvPicPr>
+          <p:cNvPr id="41" name="Picture 40">
+            <a:extLst>
+              <a:ext uri="{FF2B5EF4-FFF2-40B4-BE49-F238E27FC236}">
+                <a16:creationId xmlns:a16="http://schemas.microsoft.com/office/drawing/2014/main" id="{348B9DD2-14EF-8A40-98DC-057C16492476}"/>
+              </a:ext>
+            </a:extLst>
+          </p:cNvPr>
+          <p:cNvPicPr>
+            <a:picLocks noChangeAspect="1"/>
+          </p:cNvPicPr>
+          <p:nvPr/>
+        </p:nvPicPr>
+        <p:blipFill>
+          <a:blip r:embed="rId5"/>
+          <a:stretch>
+            <a:fillRect/>
+          </a:stretch>
+        </p:blipFill>
+        <p:spPr>
+          <a:xfrm>
+            <a:off x="8672552" y="663956"/>
+            <a:ext cx="641466" cy="619089"/>
+          </a:xfrm>
+          <a:prstGeom prst="rect">
+            <a:avLst/>
+          </a:prstGeom>
+        </p:spPr>
+      </p:pic>
+      <p:sp>
+        <p:nvSpPr>
+          <p:cNvPr id="42" name="TextBox 41">
+            <a:extLst>
+              <a:ext uri="{FF2B5EF4-FFF2-40B4-BE49-F238E27FC236}">
+                <a16:creationId xmlns:a16="http://schemas.microsoft.com/office/drawing/2014/main" id="{55F78751-8DBF-CE4D-B560-87EAFC3B1374}"/>
+              </a:ext>
+            </a:extLst>
+          </p:cNvPr>
+          <p:cNvSpPr txBox="1"/>
+          <p:nvPr/>
+        </p:nvSpPr>
+        <p:spPr>
+          <a:xfrm>
+            <a:off x="8328006" y="365048"/>
+            <a:ext cx="1330557" cy="369332"/>
+          </a:xfrm>
+          <a:prstGeom prst="rect">
+            <a:avLst/>
+          </a:prstGeom>
+          <a:noFill/>
+        </p:spPr>
+        <p:txBody>
+          <a:bodyPr wrap="none" rtlCol="0">
+            <a:spAutoFit/>
+          </a:bodyPr>
+          <a:lstStyle/>
+          <a:p>
+            <a:r>
+              <a:rPr lang="en-US" dirty="0"/>
+              <a:t>Amazon ELB</a:t>
             </a:r>
           </a:p>
         </p:txBody>

</xml_diff>

<commit_message>
Replaced the basic Fluentd logging module with CW Container Insights. Refactored the scripts for more consistent outcomes (both for setup and cleanup).
</commit_message>
<xml_diff>
--- a/ekstender.pptx
+++ b/ekstender.pptx
@@ -197,7 +197,7 @@
           <a:p>
             <a:fld id="{B6707FB1-E1F5-C240-9110-0150C7F6B965}" type="datetimeFigureOut">
               <a:rPr lang="en-US" smtClean="0"/>
-              <a:t>6/4/19</a:t>
+              <a:t>6/24/19</a:t>
             </a:fld>
             <a:endParaRPr lang="en-US"/>
           </a:p>
@@ -695,7 +695,7 @@
           <a:p>
             <a:fld id="{DF731274-5EC7-294F-BC8D-4FC9B8426EBA}" type="datetimeFigureOut">
               <a:rPr lang="en-US" smtClean="0"/>
-              <a:t>6/4/19</a:t>
+              <a:t>6/24/19</a:t>
             </a:fld>
             <a:endParaRPr lang="en-US"/>
           </a:p>
@@ -893,7 +893,7 @@
           <a:p>
             <a:fld id="{DF731274-5EC7-294F-BC8D-4FC9B8426EBA}" type="datetimeFigureOut">
               <a:rPr lang="en-US" smtClean="0"/>
-              <a:t>6/4/19</a:t>
+              <a:t>6/24/19</a:t>
             </a:fld>
             <a:endParaRPr lang="en-US"/>
           </a:p>
@@ -1101,7 +1101,7 @@
           <a:p>
             <a:fld id="{DF731274-5EC7-294F-BC8D-4FC9B8426EBA}" type="datetimeFigureOut">
               <a:rPr lang="en-US" smtClean="0"/>
-              <a:t>6/4/19</a:t>
+              <a:t>6/24/19</a:t>
             </a:fld>
             <a:endParaRPr lang="en-US"/>
           </a:p>
@@ -1299,7 +1299,7 @@
           <a:p>
             <a:fld id="{DF731274-5EC7-294F-BC8D-4FC9B8426EBA}" type="datetimeFigureOut">
               <a:rPr lang="en-US" smtClean="0"/>
-              <a:t>6/4/19</a:t>
+              <a:t>6/24/19</a:t>
             </a:fld>
             <a:endParaRPr lang="en-US"/>
           </a:p>
@@ -1574,7 +1574,7 @@
           <a:p>
             <a:fld id="{DF731274-5EC7-294F-BC8D-4FC9B8426EBA}" type="datetimeFigureOut">
               <a:rPr lang="en-US" smtClean="0"/>
-              <a:t>6/4/19</a:t>
+              <a:t>6/24/19</a:t>
             </a:fld>
             <a:endParaRPr lang="en-US"/>
           </a:p>
@@ -1839,7 +1839,7 @@
           <a:p>
             <a:fld id="{DF731274-5EC7-294F-BC8D-4FC9B8426EBA}" type="datetimeFigureOut">
               <a:rPr lang="en-US" smtClean="0"/>
-              <a:t>6/4/19</a:t>
+              <a:t>6/24/19</a:t>
             </a:fld>
             <a:endParaRPr lang="en-US"/>
           </a:p>
@@ -2251,7 +2251,7 @@
           <a:p>
             <a:fld id="{DF731274-5EC7-294F-BC8D-4FC9B8426EBA}" type="datetimeFigureOut">
               <a:rPr lang="en-US" smtClean="0"/>
-              <a:t>6/4/19</a:t>
+              <a:t>6/24/19</a:t>
             </a:fld>
             <a:endParaRPr lang="en-US"/>
           </a:p>
@@ -2392,7 +2392,7 @@
           <a:p>
             <a:fld id="{DF731274-5EC7-294F-BC8D-4FC9B8426EBA}" type="datetimeFigureOut">
               <a:rPr lang="en-US" smtClean="0"/>
-              <a:t>6/4/19</a:t>
+              <a:t>6/24/19</a:t>
             </a:fld>
             <a:endParaRPr lang="en-US"/>
           </a:p>
@@ -2505,7 +2505,7 @@
           <a:p>
             <a:fld id="{DF731274-5EC7-294F-BC8D-4FC9B8426EBA}" type="datetimeFigureOut">
               <a:rPr lang="en-US" smtClean="0"/>
-              <a:t>6/4/19</a:t>
+              <a:t>6/24/19</a:t>
             </a:fld>
             <a:endParaRPr lang="en-US"/>
           </a:p>
@@ -2816,7 +2816,7 @@
           <a:p>
             <a:fld id="{DF731274-5EC7-294F-BC8D-4FC9B8426EBA}" type="datetimeFigureOut">
               <a:rPr lang="en-US" smtClean="0"/>
-              <a:t>6/4/19</a:t>
+              <a:t>6/24/19</a:t>
             </a:fld>
             <a:endParaRPr lang="en-US"/>
           </a:p>
@@ -3104,7 +3104,7 @@
           <a:p>
             <a:fld id="{DF731274-5EC7-294F-BC8D-4FC9B8426EBA}" type="datetimeFigureOut">
               <a:rPr lang="en-US" smtClean="0"/>
-              <a:t>6/4/19</a:t>
+              <a:t>6/24/19</a:t>
             </a:fld>
             <a:endParaRPr lang="en-US"/>
           </a:p>
@@ -3345,7 +3345,7 @@
           <a:p>
             <a:fld id="{DF731274-5EC7-294F-BC8D-4FC9B8426EBA}" type="datetimeFigureOut">
               <a:rPr lang="en-US" smtClean="0"/>
-              <a:t>6/4/19</a:t>
+              <a:t>6/24/19</a:t>
             </a:fld>
             <a:endParaRPr lang="en-US"/>
           </a:p>
@@ -4042,7 +4042,7 @@
                   <a:schemeClr val="tx1"/>
                 </a:solidFill>
               </a:rPr>
-              <a:t>Fluentd</a:t>
+              <a:t>Container Insights</a:t>
             </a:r>
           </a:p>
         </p:txBody>

</xml_diff>

<commit_message>
Added Kubeflow and App Mesh modules. Major re-factors of many portions of the script.
</commit_message>
<xml_diff>
--- a/ekstender.pptx
+++ b/ekstender.pptx
@@ -197,7 +197,7 @@
           <a:p>
             <a:fld id="{B6707FB1-E1F5-C240-9110-0150C7F6B965}" type="datetimeFigureOut">
               <a:rPr lang="en-US" smtClean="0"/>
-              <a:t>6/24/19</a:t>
+              <a:t>7/2/19</a:t>
             </a:fld>
             <a:endParaRPr lang="en-US"/>
           </a:p>
@@ -695,7 +695,7 @@
           <a:p>
             <a:fld id="{DF731274-5EC7-294F-BC8D-4FC9B8426EBA}" type="datetimeFigureOut">
               <a:rPr lang="en-US" smtClean="0"/>
-              <a:t>6/24/19</a:t>
+              <a:t>7/2/19</a:t>
             </a:fld>
             <a:endParaRPr lang="en-US"/>
           </a:p>
@@ -893,7 +893,7 @@
           <a:p>
             <a:fld id="{DF731274-5EC7-294F-BC8D-4FC9B8426EBA}" type="datetimeFigureOut">
               <a:rPr lang="en-US" smtClean="0"/>
-              <a:t>6/24/19</a:t>
+              <a:t>7/2/19</a:t>
             </a:fld>
             <a:endParaRPr lang="en-US"/>
           </a:p>
@@ -1101,7 +1101,7 @@
           <a:p>
             <a:fld id="{DF731274-5EC7-294F-BC8D-4FC9B8426EBA}" type="datetimeFigureOut">
               <a:rPr lang="en-US" smtClean="0"/>
-              <a:t>6/24/19</a:t>
+              <a:t>7/2/19</a:t>
             </a:fld>
             <a:endParaRPr lang="en-US"/>
           </a:p>
@@ -1299,7 +1299,7 @@
           <a:p>
             <a:fld id="{DF731274-5EC7-294F-BC8D-4FC9B8426EBA}" type="datetimeFigureOut">
               <a:rPr lang="en-US" smtClean="0"/>
-              <a:t>6/24/19</a:t>
+              <a:t>7/2/19</a:t>
             </a:fld>
             <a:endParaRPr lang="en-US"/>
           </a:p>
@@ -1574,7 +1574,7 @@
           <a:p>
             <a:fld id="{DF731274-5EC7-294F-BC8D-4FC9B8426EBA}" type="datetimeFigureOut">
               <a:rPr lang="en-US" smtClean="0"/>
-              <a:t>6/24/19</a:t>
+              <a:t>7/2/19</a:t>
             </a:fld>
             <a:endParaRPr lang="en-US"/>
           </a:p>
@@ -1839,7 +1839,7 @@
           <a:p>
             <a:fld id="{DF731274-5EC7-294F-BC8D-4FC9B8426EBA}" type="datetimeFigureOut">
               <a:rPr lang="en-US" smtClean="0"/>
-              <a:t>6/24/19</a:t>
+              <a:t>7/2/19</a:t>
             </a:fld>
             <a:endParaRPr lang="en-US"/>
           </a:p>
@@ -2251,7 +2251,7 @@
           <a:p>
             <a:fld id="{DF731274-5EC7-294F-BC8D-4FC9B8426EBA}" type="datetimeFigureOut">
               <a:rPr lang="en-US" smtClean="0"/>
-              <a:t>6/24/19</a:t>
+              <a:t>7/2/19</a:t>
             </a:fld>
             <a:endParaRPr lang="en-US"/>
           </a:p>
@@ -2392,7 +2392,7 @@
           <a:p>
             <a:fld id="{DF731274-5EC7-294F-BC8D-4FC9B8426EBA}" type="datetimeFigureOut">
               <a:rPr lang="en-US" smtClean="0"/>
-              <a:t>6/24/19</a:t>
+              <a:t>7/2/19</a:t>
             </a:fld>
             <a:endParaRPr lang="en-US"/>
           </a:p>
@@ -2505,7 +2505,7 @@
           <a:p>
             <a:fld id="{DF731274-5EC7-294F-BC8D-4FC9B8426EBA}" type="datetimeFigureOut">
               <a:rPr lang="en-US" smtClean="0"/>
-              <a:t>6/24/19</a:t>
+              <a:t>7/2/19</a:t>
             </a:fld>
             <a:endParaRPr lang="en-US"/>
           </a:p>
@@ -2816,7 +2816,7 @@
           <a:p>
             <a:fld id="{DF731274-5EC7-294F-BC8D-4FC9B8426EBA}" type="datetimeFigureOut">
               <a:rPr lang="en-US" smtClean="0"/>
-              <a:t>6/24/19</a:t>
+              <a:t>7/2/19</a:t>
             </a:fld>
             <a:endParaRPr lang="en-US"/>
           </a:p>
@@ -3104,7 +3104,7 @@
           <a:p>
             <a:fld id="{DF731274-5EC7-294F-BC8D-4FC9B8426EBA}" type="datetimeFigureOut">
               <a:rPr lang="en-US" smtClean="0"/>
-              <a:t>6/24/19</a:t>
+              <a:t>7/2/19</a:t>
             </a:fld>
             <a:endParaRPr lang="en-US"/>
           </a:p>
@@ -3345,7 +3345,7 @@
           <a:p>
             <a:fld id="{DF731274-5EC7-294F-BC8D-4FC9B8426EBA}" type="datetimeFigureOut">
               <a:rPr lang="en-US" smtClean="0"/>
-              <a:t>6/24/19</a:t>
+              <a:t>7/2/19</a:t>
             </a:fld>
             <a:endParaRPr lang="en-US"/>
           </a:p>
@@ -4330,7 +4330,7 @@
                   <a:schemeClr val="bg1"/>
                 </a:solidFill>
               </a:rPr>
-              <a:t>Prometheus</a:t>
+              <a:t>Kubeflow</a:t>
             </a:r>
           </a:p>
         </p:txBody>
@@ -4639,52 +4639,6 @@
       </p:cxnSp>
       <p:cxnSp>
         <p:nvCxnSpPr>
-          <p:cNvPr id="26" name="Straight Arrow Connector 25">
-            <a:extLst>
-              <a:ext uri="{FF2B5EF4-FFF2-40B4-BE49-F238E27FC236}">
-                <a16:creationId xmlns:a16="http://schemas.microsoft.com/office/drawing/2014/main" id="{2B0F973C-F5F3-F34B-827D-C127C3010A0C}"/>
-              </a:ext>
-            </a:extLst>
-          </p:cNvPr>
-          <p:cNvCxnSpPr>
-            <a:cxnSpLocks/>
-            <a:stCxn id="14" idx="0"/>
-            <a:endCxn id="33" idx="2"/>
-          </p:cNvCxnSpPr>
-          <p:nvPr/>
-        </p:nvCxnSpPr>
-        <p:spPr>
-          <a:xfrm flipH="1" flipV="1">
-            <a:off x="5538530" y="1278313"/>
-            <a:ext cx="1" cy="1194220"/>
-          </a:xfrm>
-          <a:prstGeom prst="straightConnector1">
-            <a:avLst/>
-          </a:prstGeom>
-          <a:ln w="38100">
-            <a:solidFill>
-              <a:schemeClr val="tx1"/>
-            </a:solidFill>
-            <a:tailEnd type="triangle"/>
-          </a:ln>
-        </p:spPr>
-        <p:style>
-          <a:lnRef idx="1">
-            <a:schemeClr val="accent1"/>
-          </a:lnRef>
-          <a:fillRef idx="0">
-            <a:schemeClr val="accent1"/>
-          </a:fillRef>
-          <a:effectRef idx="0">
-            <a:schemeClr val="accent1"/>
-          </a:effectRef>
-          <a:fontRef idx="minor">
-            <a:schemeClr val="tx1"/>
-          </a:fontRef>
-        </p:style>
-      </p:cxnSp>
-      <p:cxnSp>
-        <p:nvCxnSpPr>
           <p:cNvPr id="29" name="Straight Arrow Connector 28">
             <a:extLst>
               <a:ext uri="{FF2B5EF4-FFF2-40B4-BE49-F238E27FC236}">
@@ -4711,6 +4665,7 @@
             <a:solidFill>
               <a:schemeClr val="tx1"/>
             </a:solidFill>
+            <a:prstDash val="dash"/>
             <a:tailEnd type="triangle"/>
           </a:ln>
         </p:spPr>
@@ -4751,7 +4706,7 @@
         </p:blipFill>
         <p:spPr>
           <a:xfrm>
-            <a:off x="5217797" y="659224"/>
+            <a:off x="6026320" y="659222"/>
             <a:ext cx="641466" cy="619089"/>
           </a:xfrm>
           <a:prstGeom prst="rect">
@@ -4847,76 +4802,6 @@
           </a:p>
         </p:txBody>
       </p:sp>
-      <p:sp>
-        <p:nvSpPr>
-          <p:cNvPr id="12" name="TextBox 11">
-            <a:extLst>
-              <a:ext uri="{FF2B5EF4-FFF2-40B4-BE49-F238E27FC236}">
-                <a16:creationId xmlns:a16="http://schemas.microsoft.com/office/drawing/2014/main" id="{B1F7F08E-920E-FD46-8B89-19D1FEC137B0}"/>
-              </a:ext>
-            </a:extLst>
-          </p:cNvPr>
-          <p:cNvSpPr txBox="1"/>
-          <p:nvPr/>
-        </p:nvSpPr>
-        <p:spPr>
-          <a:xfrm>
-            <a:off x="4873251" y="360315"/>
-            <a:ext cx="1330557" cy="369332"/>
-          </a:xfrm>
-          <a:prstGeom prst="rect">
-            <a:avLst/>
-          </a:prstGeom>
-          <a:noFill/>
-        </p:spPr>
-        <p:txBody>
-          <a:bodyPr wrap="none" rtlCol="0">
-            <a:spAutoFit/>
-          </a:bodyPr>
-          <a:lstStyle/>
-          <a:p>
-            <a:r>
-              <a:rPr lang="en-US" dirty="0"/>
-              <a:t>Amazon ELB</a:t>
-            </a:r>
-          </a:p>
-        </p:txBody>
-      </p:sp>
-      <p:sp>
-        <p:nvSpPr>
-          <p:cNvPr id="27" name="TextBox 26">
-            <a:extLst>
-              <a:ext uri="{FF2B5EF4-FFF2-40B4-BE49-F238E27FC236}">
-                <a16:creationId xmlns:a16="http://schemas.microsoft.com/office/drawing/2014/main" id="{F3325672-5C2F-4A45-B059-D6E508CDDD97}"/>
-              </a:ext>
-            </a:extLst>
-          </p:cNvPr>
-          <p:cNvSpPr txBox="1"/>
-          <p:nvPr/>
-        </p:nvSpPr>
-        <p:spPr>
-          <a:xfrm>
-            <a:off x="6600184" y="360315"/>
-            <a:ext cx="1330557" cy="369332"/>
-          </a:xfrm>
-          <a:prstGeom prst="rect">
-            <a:avLst/>
-          </a:prstGeom>
-          <a:noFill/>
-        </p:spPr>
-        <p:txBody>
-          <a:bodyPr wrap="none" rtlCol="0">
-            <a:spAutoFit/>
-          </a:bodyPr>
-          <a:lstStyle/>
-          <a:p>
-            <a:r>
-              <a:rPr lang="en-US" dirty="0"/>
-              <a:t>Amazon ELB</a:t>
-            </a:r>
-          </a:p>
-        </p:txBody>
-      </p:sp>
       <p:pic>
         <p:nvPicPr>
           <p:cNvPr id="28" name="Picture 27">
@@ -4988,52 +4873,6 @@
           </a:p>
         </p:txBody>
       </p:sp>
-      <p:cxnSp>
-        <p:nvCxnSpPr>
-          <p:cNvPr id="31" name="Straight Arrow Connector 30">
-            <a:extLst>
-              <a:ext uri="{FF2B5EF4-FFF2-40B4-BE49-F238E27FC236}">
-                <a16:creationId xmlns:a16="http://schemas.microsoft.com/office/drawing/2014/main" id="{515E6AC3-EE35-6D49-890D-5ECBA150A5CC}"/>
-              </a:ext>
-            </a:extLst>
-          </p:cNvPr>
-          <p:cNvCxnSpPr>
-            <a:cxnSpLocks/>
-            <a:stCxn id="64" idx="0"/>
-            <a:endCxn id="32" idx="2"/>
-          </p:cNvCxnSpPr>
-          <p:nvPr/>
-        </p:nvCxnSpPr>
-        <p:spPr>
-          <a:xfrm flipH="1" flipV="1">
-            <a:off x="10719264" y="1278312"/>
-            <a:ext cx="4877" cy="1198561"/>
-          </a:xfrm>
-          <a:prstGeom prst="straightConnector1">
-            <a:avLst/>
-          </a:prstGeom>
-          <a:ln w="38100">
-            <a:solidFill>
-              <a:schemeClr val="tx1"/>
-            </a:solidFill>
-            <a:tailEnd type="triangle"/>
-          </a:ln>
-        </p:spPr>
-        <p:style>
-          <a:lnRef idx="1">
-            <a:schemeClr val="accent1"/>
-          </a:lnRef>
-          <a:fillRef idx="0">
-            <a:schemeClr val="accent1"/>
-          </a:fillRef>
-          <a:effectRef idx="0">
-            <a:schemeClr val="accent1"/>
-          </a:effectRef>
-          <a:fontRef idx="minor">
-            <a:schemeClr val="tx1"/>
-          </a:fontRef>
-        </p:style>
-      </p:cxnSp>
       <p:pic>
         <p:nvPicPr>
           <p:cNvPr id="32" name="Picture 31">
@@ -5056,7 +4895,7 @@
         </p:blipFill>
         <p:spPr>
           <a:xfrm>
-            <a:off x="10398531" y="659223"/>
+            <a:off x="8596264" y="660392"/>
             <a:ext cx="641466" cy="619089"/>
           </a:xfrm>
           <a:prstGeom prst="rect">
@@ -5064,41 +4903,6 @@
           </a:prstGeom>
         </p:spPr>
       </p:pic>
-      <p:sp>
-        <p:nvSpPr>
-          <p:cNvPr id="34" name="TextBox 33">
-            <a:extLst>
-              <a:ext uri="{FF2B5EF4-FFF2-40B4-BE49-F238E27FC236}">
-                <a16:creationId xmlns:a16="http://schemas.microsoft.com/office/drawing/2014/main" id="{792DCBC4-8172-C34E-9064-7783423A8F09}"/>
-              </a:ext>
-            </a:extLst>
-          </p:cNvPr>
-          <p:cNvSpPr txBox="1"/>
-          <p:nvPr/>
-        </p:nvSpPr>
-        <p:spPr>
-          <a:xfrm>
-            <a:off x="10053985" y="360315"/>
-            <a:ext cx="1351396" cy="369332"/>
-          </a:xfrm>
-          <a:prstGeom prst="rect">
-            <a:avLst/>
-          </a:prstGeom>
-          <a:noFill/>
-        </p:spPr>
-        <p:txBody>
-          <a:bodyPr wrap="none" rtlCol="0">
-            <a:spAutoFit/>
-          </a:bodyPr>
-          <a:lstStyle/>
-          <a:p>
-            <a:r>
-              <a:rPr lang="en-US" dirty="0"/>
-              <a:t>Amazon ALB</a:t>
-            </a:r>
-          </a:p>
-        </p:txBody>
-      </p:sp>
       <p:sp>
         <p:nvSpPr>
           <p:cNvPr id="35" name="Rounded Rectangle 34">
@@ -5178,7 +4982,9 @@
           <a:prstGeom prst="roundRect">
             <a:avLst/>
           </a:prstGeom>
-          <a:noFill/>
+          <a:solidFill>
+            <a:srgbClr val="7030A0"/>
+          </a:solidFill>
         </p:spPr>
         <p:style>
           <a:lnRef idx="2">
@@ -5201,11 +5007,14 @@
           <a:lstStyle/>
           <a:p>
             <a:pPr algn="ctr"/>
-            <a:endParaRPr lang="en-US" sz="1400" b="1" i="1" dirty="0">
-              <a:solidFill>
-                <a:schemeClr val="bg1"/>
-              </a:solidFill>
-            </a:endParaRPr>
+            <a:r>
+              <a:rPr lang="en-US" sz="1400" b="1" i="1" dirty="0">
+                <a:solidFill>
+                  <a:schemeClr val="bg1"/>
+                </a:solidFill>
+              </a:rPr>
+              <a:t>App Mesh</a:t>
+            </a:r>
           </a:p>
         </p:txBody>
       </p:sp>
@@ -5288,7 +5097,11 @@
           <a:prstGeom prst="roundRect">
             <a:avLst/>
           </a:prstGeom>
-          <a:noFill/>
+          <a:solidFill>
+            <a:schemeClr val="accent4">
+              <a:lumMod val="50000"/>
+            </a:schemeClr>
+          </a:solidFill>
         </p:spPr>
         <p:style>
           <a:lnRef idx="2">
@@ -5311,36 +5124,98 @@
           <a:lstStyle/>
           <a:p>
             <a:pPr algn="ctr"/>
-            <a:endParaRPr lang="en-US" sz="1400" b="1" i="1" dirty="0">
-              <a:solidFill>
-                <a:schemeClr val="bg1"/>
-              </a:solidFill>
-            </a:endParaRPr>
-          </a:p>
-        </p:txBody>
-      </p:sp>
+            <a:r>
+              <a:rPr lang="en-US" sz="1400" b="1" i="1" dirty="0">
+                <a:solidFill>
+                  <a:schemeClr val="bg1"/>
+                </a:solidFill>
+              </a:rPr>
+              <a:t>Prometheus</a:t>
+            </a:r>
+          </a:p>
+        </p:txBody>
+      </p:sp>
+      <p:pic>
+        <p:nvPicPr>
+          <p:cNvPr id="41" name="Picture 40">
+            <a:extLst>
+              <a:ext uri="{FF2B5EF4-FFF2-40B4-BE49-F238E27FC236}">
+                <a16:creationId xmlns:a16="http://schemas.microsoft.com/office/drawing/2014/main" id="{348B9DD2-14EF-8A40-98DC-057C16492476}"/>
+              </a:ext>
+            </a:extLst>
+          </p:cNvPr>
+          <p:cNvPicPr>
+            <a:picLocks noChangeAspect="1"/>
+          </p:cNvPicPr>
+          <p:nvPr/>
+        </p:nvPicPr>
+        <p:blipFill>
+          <a:blip r:embed="rId5"/>
+          <a:stretch>
+            <a:fillRect/>
+          </a:stretch>
+        </p:blipFill>
+        <p:spPr>
+          <a:xfrm>
+            <a:off x="7770497" y="663956"/>
+            <a:ext cx="641466" cy="619089"/>
+          </a:xfrm>
+          <a:prstGeom prst="rect">
+            <a:avLst/>
+          </a:prstGeom>
+        </p:spPr>
+      </p:pic>
+      <p:pic>
+        <p:nvPicPr>
+          <p:cNvPr id="43" name="Picture 42">
+            <a:extLst>
+              <a:ext uri="{FF2B5EF4-FFF2-40B4-BE49-F238E27FC236}">
+                <a16:creationId xmlns:a16="http://schemas.microsoft.com/office/drawing/2014/main" id="{CE19DB69-89EB-B648-88C6-15557E4B3B0F}"/>
+              </a:ext>
+            </a:extLst>
+          </p:cNvPr>
+          <p:cNvPicPr>
+            <a:picLocks noChangeAspect="1"/>
+          </p:cNvPicPr>
+          <p:nvPr/>
+        </p:nvPicPr>
+        <p:blipFill>
+          <a:blip r:embed="rId5"/>
+          <a:stretch>
+            <a:fillRect/>
+          </a:stretch>
+        </p:blipFill>
+        <p:spPr>
+          <a:xfrm>
+            <a:off x="9418077" y="659222"/>
+            <a:ext cx="641466" cy="619089"/>
+          </a:xfrm>
+          <a:prstGeom prst="rect">
+            <a:avLst/>
+          </a:prstGeom>
+        </p:spPr>
+      </p:pic>
       <p:cxnSp>
         <p:nvCxnSpPr>
-          <p:cNvPr id="40" name="Straight Arrow Connector 39">
-            <a:extLst>
-              <a:ext uri="{FF2B5EF4-FFF2-40B4-BE49-F238E27FC236}">
-                <a16:creationId xmlns:a16="http://schemas.microsoft.com/office/drawing/2014/main" id="{D3811362-B1C4-7941-BB4F-211B75C08AF5}"/>
+          <p:cNvPr id="24" name="Elbow Connector 23">
+            <a:extLst>
+              <a:ext uri="{FF2B5EF4-FFF2-40B4-BE49-F238E27FC236}">
+                <a16:creationId xmlns:a16="http://schemas.microsoft.com/office/drawing/2014/main" id="{71F5ED95-537A-5541-9E34-52622CE69898}"/>
               </a:ext>
             </a:extLst>
           </p:cNvPr>
           <p:cNvCxnSpPr>
-            <a:cxnSpLocks/>
-            <a:stCxn id="15" idx="0"/>
-            <a:endCxn id="41" idx="2"/>
+            <a:stCxn id="64" idx="0"/>
+            <a:endCxn id="32" idx="2"/>
           </p:cNvCxnSpPr>
           <p:nvPr/>
         </p:nvCxnSpPr>
         <p:spPr>
-          <a:xfrm flipH="1" flipV="1">
-            <a:off x="8993285" y="1283045"/>
-            <a:ext cx="2320" cy="1192449"/>
-          </a:xfrm>
-          <a:prstGeom prst="straightConnector1">
+          <a:xfrm rot="16200000" flipV="1">
+            <a:off x="9221873" y="974605"/>
+            <a:ext cx="1197392" cy="1807144"/>
+          </a:xfrm>
+          <a:prstGeom prst="bentConnector3">
             <a:avLst/>
           </a:prstGeom>
           <a:ln w="38100">
@@ -5365,71 +5240,152 @@
           </a:fontRef>
         </p:style>
       </p:cxnSp>
-      <p:pic>
-        <p:nvPicPr>
-          <p:cNvPr id="41" name="Picture 40">
-            <a:extLst>
-              <a:ext uri="{FF2B5EF4-FFF2-40B4-BE49-F238E27FC236}">
-                <a16:creationId xmlns:a16="http://schemas.microsoft.com/office/drawing/2014/main" id="{348B9DD2-14EF-8A40-98DC-057C16492476}"/>
-              </a:ext>
-            </a:extLst>
-          </p:cNvPr>
-          <p:cNvPicPr>
-            <a:picLocks noChangeAspect="1"/>
-          </p:cNvPicPr>
+      <p:cxnSp>
+        <p:nvCxnSpPr>
+          <p:cNvPr id="46" name="Elbow Connector 45">
+            <a:extLst>
+              <a:ext uri="{FF2B5EF4-FFF2-40B4-BE49-F238E27FC236}">
+                <a16:creationId xmlns:a16="http://schemas.microsoft.com/office/drawing/2014/main" id="{9723C93A-CC60-D14F-8700-06D3BAD86EF8}"/>
+              </a:ext>
+            </a:extLst>
+          </p:cNvPr>
+          <p:cNvCxnSpPr>
+            <a:cxnSpLocks/>
+            <a:stCxn id="39" idx="3"/>
+            <a:endCxn id="43" idx="2"/>
+          </p:cNvCxnSpPr>
           <p:nvPr/>
-        </p:nvPicPr>
-        <p:blipFill>
-          <a:blip r:embed="rId5"/>
-          <a:stretch>
-            <a:fillRect/>
-          </a:stretch>
-        </p:blipFill>
+        </p:nvCxnSpPr>
         <p:spPr>
-          <a:xfrm>
-            <a:off x="8672552" y="663956"/>
-            <a:ext cx="641466" cy="619089"/>
-          </a:xfrm>
-          <a:prstGeom prst="rect">
-            <a:avLst/>
+          <a:xfrm flipH="1" flipV="1">
+            <a:off x="9738810" y="1278311"/>
+            <a:ext cx="1795457" cy="1934123"/>
+          </a:xfrm>
+          <a:prstGeom prst="bentConnector4">
+            <a:avLst>
+              <a:gd name="adj1" fmla="val -12732"/>
+              <a:gd name="adj2" fmla="val 84923"/>
+            </a:avLst>
           </a:prstGeom>
-        </p:spPr>
-      </p:pic>
-      <p:sp>
-        <p:nvSpPr>
-          <p:cNvPr id="42" name="TextBox 41">
-            <a:extLst>
-              <a:ext uri="{FF2B5EF4-FFF2-40B4-BE49-F238E27FC236}">
-                <a16:creationId xmlns:a16="http://schemas.microsoft.com/office/drawing/2014/main" id="{55F78751-8DBF-CE4D-B560-87EAFC3B1374}"/>
-              </a:ext>
-            </a:extLst>
-          </p:cNvPr>
-          <p:cNvSpPr txBox="1"/>
+          <a:ln w="38100">
+            <a:solidFill>
+              <a:schemeClr val="tx1"/>
+            </a:solidFill>
+            <a:prstDash val="dash"/>
+            <a:tailEnd type="triangle"/>
+          </a:ln>
+        </p:spPr>
+        <p:style>
+          <a:lnRef idx="1">
+            <a:schemeClr val="accent1"/>
+          </a:lnRef>
+          <a:fillRef idx="0">
+            <a:schemeClr val="accent1"/>
+          </a:fillRef>
+          <a:effectRef idx="0">
+            <a:schemeClr val="accent1"/>
+          </a:effectRef>
+          <a:fontRef idx="minor">
+            <a:schemeClr val="tx1"/>
+          </a:fontRef>
+        </p:style>
+      </p:cxnSp>
+      <p:cxnSp>
+        <p:nvCxnSpPr>
+          <p:cNvPr id="52" name="Elbow Connector 51">
+            <a:extLst>
+              <a:ext uri="{FF2B5EF4-FFF2-40B4-BE49-F238E27FC236}">
+                <a16:creationId xmlns:a16="http://schemas.microsoft.com/office/drawing/2014/main" id="{41D3088E-5C15-4646-8F1B-CB14FED35000}"/>
+              </a:ext>
+            </a:extLst>
+          </p:cNvPr>
+          <p:cNvCxnSpPr>
+            <a:cxnSpLocks/>
+            <a:stCxn id="15" idx="0"/>
+            <a:endCxn id="41" idx="2"/>
+          </p:cNvCxnSpPr>
           <p:nvPr/>
-        </p:nvSpPr>
+        </p:nvCxnSpPr>
         <p:spPr>
-          <a:xfrm>
-            <a:off x="8328006" y="365048"/>
-            <a:ext cx="1330557" cy="369332"/>
-          </a:xfrm>
-          <a:prstGeom prst="rect">
-            <a:avLst/>
+          <a:xfrm rot="16200000" flipV="1">
+            <a:off x="7947194" y="1427082"/>
+            <a:ext cx="1192449" cy="904375"/>
+          </a:xfrm>
+          <a:prstGeom prst="bentConnector3">
+            <a:avLst>
+              <a:gd name="adj1" fmla="val 36411"/>
+            </a:avLst>
           </a:prstGeom>
-          <a:noFill/>
-        </p:spPr>
-        <p:txBody>
-          <a:bodyPr wrap="none" rtlCol="0">
-            <a:spAutoFit/>
-          </a:bodyPr>
-          <a:lstStyle/>
-          <a:p>
-            <a:r>
-              <a:rPr lang="en-US" dirty="0"/>
-              <a:t>Amazon ELB</a:t>
-            </a:r>
-          </a:p>
-        </p:txBody>
-      </p:sp>
+          <a:ln w="38100">
+            <a:solidFill>
+              <a:schemeClr val="tx1"/>
+            </a:solidFill>
+            <a:tailEnd type="triangle"/>
+          </a:ln>
+        </p:spPr>
+        <p:style>
+          <a:lnRef idx="1">
+            <a:schemeClr val="accent1"/>
+          </a:lnRef>
+          <a:fillRef idx="0">
+            <a:schemeClr val="accent1"/>
+          </a:fillRef>
+          <a:effectRef idx="0">
+            <a:schemeClr val="accent1"/>
+          </a:effectRef>
+          <a:fontRef idx="minor">
+            <a:schemeClr val="tx1"/>
+          </a:fontRef>
+        </p:style>
+      </p:cxnSp>
+      <p:cxnSp>
+        <p:nvCxnSpPr>
+          <p:cNvPr id="56" name="Elbow Connector 55">
+            <a:extLst>
+              <a:ext uri="{FF2B5EF4-FFF2-40B4-BE49-F238E27FC236}">
+                <a16:creationId xmlns:a16="http://schemas.microsoft.com/office/drawing/2014/main" id="{D7DF46DC-F306-074F-A7F8-E1B7E9B83164}"/>
+              </a:ext>
+            </a:extLst>
+          </p:cNvPr>
+          <p:cNvCxnSpPr>
+            <a:cxnSpLocks/>
+            <a:stCxn id="14" idx="0"/>
+            <a:endCxn id="33" idx="2"/>
+          </p:cNvCxnSpPr>
+          <p:nvPr/>
+        </p:nvCxnSpPr>
+        <p:spPr>
+          <a:xfrm rot="5400000" flipH="1" flipV="1">
+            <a:off x="5345681" y="1471161"/>
+            <a:ext cx="1194222" cy="808522"/>
+          </a:xfrm>
+          <a:prstGeom prst="bentConnector3">
+            <a:avLst>
+              <a:gd name="adj1" fmla="val 50000"/>
+            </a:avLst>
+          </a:prstGeom>
+          <a:ln w="38100">
+            <a:solidFill>
+              <a:schemeClr val="tx1"/>
+            </a:solidFill>
+            <a:tailEnd type="triangle"/>
+          </a:ln>
+        </p:spPr>
+        <p:style>
+          <a:lnRef idx="1">
+            <a:schemeClr val="accent1"/>
+          </a:lnRef>
+          <a:fillRef idx="0">
+            <a:schemeClr val="accent1"/>
+          </a:fillRef>
+          <a:effectRef idx="0">
+            <a:schemeClr val="accent1"/>
+          </a:effectRef>
+          <a:fontRef idx="minor">
+            <a:schemeClr val="tx1"/>
+          </a:fontRef>
+        </p:style>
+      </p:cxnSp>
     </p:spTree>
     <p:extLst>
       <p:ext uri="{BB962C8B-B14F-4D97-AF65-F5344CB8AC3E}">

</xml_diff>

<commit_message>
First revision of the README
</commit_message>
<xml_diff>
--- a/ekstender.pptx
+++ b/ekstender.pptx
@@ -197,7 +197,7 @@
           <a:p>
             <a:fld id="{B6707FB1-E1F5-C240-9110-0150C7F6B965}" type="datetimeFigureOut">
               <a:rPr lang="en-US" smtClean="0"/>
-              <a:t>7/2/19</a:t>
+              <a:t>5/12/20</a:t>
             </a:fld>
             <a:endParaRPr lang="en-US"/>
           </a:p>
@@ -695,7 +695,7 @@
           <a:p>
             <a:fld id="{DF731274-5EC7-294F-BC8D-4FC9B8426EBA}" type="datetimeFigureOut">
               <a:rPr lang="en-US" smtClean="0"/>
-              <a:t>7/2/19</a:t>
+              <a:t>5/12/20</a:t>
             </a:fld>
             <a:endParaRPr lang="en-US"/>
           </a:p>
@@ -893,7 +893,7 @@
           <a:p>
             <a:fld id="{DF731274-5EC7-294F-BC8D-4FC9B8426EBA}" type="datetimeFigureOut">
               <a:rPr lang="en-US" smtClean="0"/>
-              <a:t>7/2/19</a:t>
+              <a:t>5/12/20</a:t>
             </a:fld>
             <a:endParaRPr lang="en-US"/>
           </a:p>
@@ -1101,7 +1101,7 @@
           <a:p>
             <a:fld id="{DF731274-5EC7-294F-BC8D-4FC9B8426EBA}" type="datetimeFigureOut">
               <a:rPr lang="en-US" smtClean="0"/>
-              <a:t>7/2/19</a:t>
+              <a:t>5/12/20</a:t>
             </a:fld>
             <a:endParaRPr lang="en-US"/>
           </a:p>
@@ -1299,7 +1299,7 @@
           <a:p>
             <a:fld id="{DF731274-5EC7-294F-BC8D-4FC9B8426EBA}" type="datetimeFigureOut">
               <a:rPr lang="en-US" smtClean="0"/>
-              <a:t>7/2/19</a:t>
+              <a:t>5/12/20</a:t>
             </a:fld>
             <a:endParaRPr lang="en-US"/>
           </a:p>
@@ -1574,7 +1574,7 @@
           <a:p>
             <a:fld id="{DF731274-5EC7-294F-BC8D-4FC9B8426EBA}" type="datetimeFigureOut">
               <a:rPr lang="en-US" smtClean="0"/>
-              <a:t>7/2/19</a:t>
+              <a:t>5/12/20</a:t>
             </a:fld>
             <a:endParaRPr lang="en-US"/>
           </a:p>
@@ -1839,7 +1839,7 @@
           <a:p>
             <a:fld id="{DF731274-5EC7-294F-BC8D-4FC9B8426EBA}" type="datetimeFigureOut">
               <a:rPr lang="en-US" smtClean="0"/>
-              <a:t>7/2/19</a:t>
+              <a:t>5/12/20</a:t>
             </a:fld>
             <a:endParaRPr lang="en-US"/>
           </a:p>
@@ -2251,7 +2251,7 @@
           <a:p>
             <a:fld id="{DF731274-5EC7-294F-BC8D-4FC9B8426EBA}" type="datetimeFigureOut">
               <a:rPr lang="en-US" smtClean="0"/>
-              <a:t>7/2/19</a:t>
+              <a:t>5/12/20</a:t>
             </a:fld>
             <a:endParaRPr lang="en-US"/>
           </a:p>
@@ -2392,7 +2392,7 @@
           <a:p>
             <a:fld id="{DF731274-5EC7-294F-BC8D-4FC9B8426EBA}" type="datetimeFigureOut">
               <a:rPr lang="en-US" smtClean="0"/>
-              <a:t>7/2/19</a:t>
+              <a:t>5/12/20</a:t>
             </a:fld>
             <a:endParaRPr lang="en-US"/>
           </a:p>
@@ -2505,7 +2505,7 @@
           <a:p>
             <a:fld id="{DF731274-5EC7-294F-BC8D-4FC9B8426EBA}" type="datetimeFigureOut">
               <a:rPr lang="en-US" smtClean="0"/>
-              <a:t>7/2/19</a:t>
+              <a:t>5/12/20</a:t>
             </a:fld>
             <a:endParaRPr lang="en-US"/>
           </a:p>
@@ -2816,7 +2816,7 @@
           <a:p>
             <a:fld id="{DF731274-5EC7-294F-BC8D-4FC9B8426EBA}" type="datetimeFigureOut">
               <a:rPr lang="en-US" smtClean="0"/>
-              <a:t>7/2/19</a:t>
+              <a:t>5/12/20</a:t>
             </a:fld>
             <a:endParaRPr lang="en-US"/>
           </a:p>
@@ -3104,7 +3104,7 @@
           <a:p>
             <a:fld id="{DF731274-5EC7-294F-BC8D-4FC9B8426EBA}" type="datetimeFigureOut">
               <a:rPr lang="en-US" smtClean="0"/>
-              <a:t>7/2/19</a:t>
+              <a:t>5/12/20</a:t>
             </a:fld>
             <a:endParaRPr lang="en-US"/>
           </a:p>
@@ -3345,7 +3345,7 @@
           <a:p>
             <a:fld id="{DF731274-5EC7-294F-BC8D-4FC9B8426EBA}" type="datetimeFigureOut">
               <a:rPr lang="en-US" smtClean="0"/>
-              <a:t>7/2/19</a:t>
+              <a:t>5/12/20</a:t>
             </a:fld>
             <a:endParaRPr lang="en-US"/>
           </a:p>
@@ -4157,7 +4157,7 @@
                   <a:schemeClr val="tx1"/>
                 </a:solidFill>
               </a:rPr>
-              <a:t>Helm (Tiller)</a:t>
+              <a:t>CIS (EBS, EFS, FSx)</a:t>
             </a:r>
           </a:p>
         </p:txBody>
@@ -4330,7 +4330,7 @@
                   <a:schemeClr val="bg1"/>
                 </a:solidFill>
               </a:rPr>
-              <a:t>Kubeflow</a:t>
+              <a:t>Ver Pod Autoscaler</a:t>
             </a:r>
           </a:p>
         </p:txBody>
@@ -4380,12 +4380,8 @@
           <a:lstStyle/>
           <a:p>
             <a:r>
-              <a:rPr lang="en-US" sz="1600" b="1" i="1" dirty="0" err="1"/>
-              <a:t>eksutils</a:t>
-            </a:r>
-            <a:r>
               <a:rPr lang="en-US" sz="1600" b="1" i="1" dirty="0"/>
-              <a:t>        </a:t>
+              <a:t>eksutils        </a:t>
             </a:r>
           </a:p>
         </p:txBody>
@@ -4957,7 +4953,7 @@
                   <a:schemeClr val="tx1"/>
                 </a:solidFill>
               </a:rPr>
-              <a:t>Metric Server</a:t>
+              <a:t>Metrics Server</a:t>
             </a:r>
           </a:p>
         </p:txBody>
@@ -5135,36 +5131,6 @@
           </a:p>
         </p:txBody>
       </p:sp>
-      <p:pic>
-        <p:nvPicPr>
-          <p:cNvPr id="41" name="Picture 40">
-            <a:extLst>
-              <a:ext uri="{FF2B5EF4-FFF2-40B4-BE49-F238E27FC236}">
-                <a16:creationId xmlns:a16="http://schemas.microsoft.com/office/drawing/2014/main" id="{348B9DD2-14EF-8A40-98DC-057C16492476}"/>
-              </a:ext>
-            </a:extLst>
-          </p:cNvPr>
-          <p:cNvPicPr>
-            <a:picLocks noChangeAspect="1"/>
-          </p:cNvPicPr>
-          <p:nvPr/>
-        </p:nvPicPr>
-        <p:blipFill>
-          <a:blip r:embed="rId5"/>
-          <a:stretch>
-            <a:fillRect/>
-          </a:stretch>
-        </p:blipFill>
-        <p:spPr>
-          <a:xfrm>
-            <a:off x="7770497" y="663956"/>
-            <a:ext cx="641466" cy="619089"/>
-          </a:xfrm>
-          <a:prstGeom prst="rect">
-            <a:avLst/>
-          </a:prstGeom>
-        </p:spPr>
-      </p:pic>
       <p:pic>
         <p:nvPicPr>
           <p:cNvPr id="43" name="Picture 42">
@@ -5272,54 +5238,6 @@
               <a:schemeClr val="tx1"/>
             </a:solidFill>
             <a:prstDash val="dash"/>
-            <a:tailEnd type="triangle"/>
-          </a:ln>
-        </p:spPr>
-        <p:style>
-          <a:lnRef idx="1">
-            <a:schemeClr val="accent1"/>
-          </a:lnRef>
-          <a:fillRef idx="0">
-            <a:schemeClr val="accent1"/>
-          </a:fillRef>
-          <a:effectRef idx="0">
-            <a:schemeClr val="accent1"/>
-          </a:effectRef>
-          <a:fontRef idx="minor">
-            <a:schemeClr val="tx1"/>
-          </a:fontRef>
-        </p:style>
-      </p:cxnSp>
-      <p:cxnSp>
-        <p:nvCxnSpPr>
-          <p:cNvPr id="52" name="Elbow Connector 51">
-            <a:extLst>
-              <a:ext uri="{FF2B5EF4-FFF2-40B4-BE49-F238E27FC236}">
-                <a16:creationId xmlns:a16="http://schemas.microsoft.com/office/drawing/2014/main" id="{41D3088E-5C15-4646-8F1B-CB14FED35000}"/>
-              </a:ext>
-            </a:extLst>
-          </p:cNvPr>
-          <p:cNvCxnSpPr>
-            <a:cxnSpLocks/>
-            <a:stCxn id="15" idx="0"/>
-            <a:endCxn id="41" idx="2"/>
-          </p:cNvCxnSpPr>
-          <p:nvPr/>
-        </p:nvCxnSpPr>
-        <p:spPr>
-          <a:xfrm rot="16200000" flipV="1">
-            <a:off x="7947194" y="1427082"/>
-            <a:ext cx="1192449" cy="904375"/>
-          </a:xfrm>
-          <a:prstGeom prst="bentConnector3">
-            <a:avLst>
-              <a:gd name="adj1" fmla="val 36411"/>
-            </a:avLst>
-          </a:prstGeom>
-          <a:ln w="38100">
-            <a:solidFill>
-              <a:schemeClr val="tx1"/>
-            </a:solidFill>
             <a:tailEnd type="triangle"/>
           </a:ln>
         </p:spPr>

</xml_diff>

<commit_message>
Added Kubecost (+ fixed ClusterAutoscaler for the new 1.18 images)
</commit_message>
<xml_diff>
--- a/ekstender.pptx
+++ b/ekstender.pptx
@@ -197,7 +197,7 @@
           <a:p>
             <a:fld id="{B6707FB1-E1F5-C240-9110-0150C7F6B965}" type="datetimeFigureOut">
               <a:rPr lang="en-US" smtClean="0"/>
-              <a:t>5/12/20</a:t>
+              <a:t>8/6/20</a:t>
             </a:fld>
             <a:endParaRPr lang="en-US"/>
           </a:p>
@@ -695,7 +695,7 @@
           <a:p>
             <a:fld id="{DF731274-5EC7-294F-BC8D-4FC9B8426EBA}" type="datetimeFigureOut">
               <a:rPr lang="en-US" smtClean="0"/>
-              <a:t>5/12/20</a:t>
+              <a:t>8/6/20</a:t>
             </a:fld>
             <a:endParaRPr lang="en-US"/>
           </a:p>
@@ -893,7 +893,7 @@
           <a:p>
             <a:fld id="{DF731274-5EC7-294F-BC8D-4FC9B8426EBA}" type="datetimeFigureOut">
               <a:rPr lang="en-US" smtClean="0"/>
-              <a:t>5/12/20</a:t>
+              <a:t>8/6/20</a:t>
             </a:fld>
             <a:endParaRPr lang="en-US"/>
           </a:p>
@@ -1101,7 +1101,7 @@
           <a:p>
             <a:fld id="{DF731274-5EC7-294F-BC8D-4FC9B8426EBA}" type="datetimeFigureOut">
               <a:rPr lang="en-US" smtClean="0"/>
-              <a:t>5/12/20</a:t>
+              <a:t>8/6/20</a:t>
             </a:fld>
             <a:endParaRPr lang="en-US"/>
           </a:p>
@@ -1299,7 +1299,7 @@
           <a:p>
             <a:fld id="{DF731274-5EC7-294F-BC8D-4FC9B8426EBA}" type="datetimeFigureOut">
               <a:rPr lang="en-US" smtClean="0"/>
-              <a:t>5/12/20</a:t>
+              <a:t>8/6/20</a:t>
             </a:fld>
             <a:endParaRPr lang="en-US"/>
           </a:p>
@@ -1574,7 +1574,7 @@
           <a:p>
             <a:fld id="{DF731274-5EC7-294F-BC8D-4FC9B8426EBA}" type="datetimeFigureOut">
               <a:rPr lang="en-US" smtClean="0"/>
-              <a:t>5/12/20</a:t>
+              <a:t>8/6/20</a:t>
             </a:fld>
             <a:endParaRPr lang="en-US"/>
           </a:p>
@@ -1839,7 +1839,7 @@
           <a:p>
             <a:fld id="{DF731274-5EC7-294F-BC8D-4FC9B8426EBA}" type="datetimeFigureOut">
               <a:rPr lang="en-US" smtClean="0"/>
-              <a:t>5/12/20</a:t>
+              <a:t>8/6/20</a:t>
             </a:fld>
             <a:endParaRPr lang="en-US"/>
           </a:p>
@@ -2251,7 +2251,7 @@
           <a:p>
             <a:fld id="{DF731274-5EC7-294F-BC8D-4FC9B8426EBA}" type="datetimeFigureOut">
               <a:rPr lang="en-US" smtClean="0"/>
-              <a:t>5/12/20</a:t>
+              <a:t>8/6/20</a:t>
             </a:fld>
             <a:endParaRPr lang="en-US"/>
           </a:p>
@@ -2392,7 +2392,7 @@
           <a:p>
             <a:fld id="{DF731274-5EC7-294F-BC8D-4FC9B8426EBA}" type="datetimeFigureOut">
               <a:rPr lang="en-US" smtClean="0"/>
-              <a:t>5/12/20</a:t>
+              <a:t>8/6/20</a:t>
             </a:fld>
             <a:endParaRPr lang="en-US"/>
           </a:p>
@@ -2505,7 +2505,7 @@
           <a:p>
             <a:fld id="{DF731274-5EC7-294F-BC8D-4FC9B8426EBA}" type="datetimeFigureOut">
               <a:rPr lang="en-US" smtClean="0"/>
-              <a:t>5/12/20</a:t>
+              <a:t>8/6/20</a:t>
             </a:fld>
             <a:endParaRPr lang="en-US"/>
           </a:p>
@@ -2816,7 +2816,7 @@
           <a:p>
             <a:fld id="{DF731274-5EC7-294F-BC8D-4FC9B8426EBA}" type="datetimeFigureOut">
               <a:rPr lang="en-US" smtClean="0"/>
-              <a:t>5/12/20</a:t>
+              <a:t>8/6/20</a:t>
             </a:fld>
             <a:endParaRPr lang="en-US"/>
           </a:p>
@@ -3104,7 +3104,7 @@
           <a:p>
             <a:fld id="{DF731274-5EC7-294F-BC8D-4FC9B8426EBA}" type="datetimeFigureOut">
               <a:rPr lang="en-US" smtClean="0"/>
-              <a:t>5/12/20</a:t>
+              <a:t>8/6/20</a:t>
             </a:fld>
             <a:endParaRPr lang="en-US"/>
           </a:p>
@@ -3345,7 +3345,7 @@
           <a:p>
             <a:fld id="{DF731274-5EC7-294F-BC8D-4FC9B8426EBA}" type="datetimeFigureOut">
               <a:rPr lang="en-US" smtClean="0"/>
-              <a:t>5/12/20</a:t>
+              <a:t>8/6/20</a:t>
             </a:fld>
             <a:endParaRPr lang="en-US"/>
           </a:p>
@@ -4454,8 +4454,8 @@
         </p:nvSpPr>
         <p:spPr>
           <a:xfrm>
-            <a:off x="4571993" y="2301918"/>
-            <a:ext cx="7038474" cy="1812888"/>
+            <a:off x="4571993" y="1828160"/>
+            <a:ext cx="7038474" cy="2286646"/>
           </a:xfrm>
           <a:prstGeom prst="roundRect">
             <a:avLst/>
@@ -4603,8 +4603,8 @@
         </p:nvCxnSpPr>
         <p:spPr>
           <a:xfrm rot="10800000" flipH="1">
-            <a:off x="685799" y="3208362"/>
-            <a:ext cx="3886193" cy="1102212"/>
+            <a:off x="685799" y="2971484"/>
+            <a:ext cx="3886193" cy="1339091"/>
           </a:xfrm>
           <a:prstGeom prst="bentConnector3">
             <a:avLst>
@@ -4651,8 +4651,8 @@
         </p:nvCxnSpPr>
         <p:spPr>
           <a:xfrm flipH="1" flipV="1">
-            <a:off x="7265463" y="1278312"/>
-            <a:ext cx="1605" cy="1194221"/>
+            <a:off x="7265463" y="774882"/>
+            <a:ext cx="1605" cy="1697651"/>
           </a:xfrm>
           <a:prstGeom prst="straightConnector1">
             <a:avLst/>
@@ -4702,7 +4702,7 @@
         </p:blipFill>
         <p:spPr>
           <a:xfrm>
-            <a:off x="6026320" y="659222"/>
+            <a:off x="6026320" y="155792"/>
             <a:ext cx="641466" cy="619089"/>
           </a:xfrm>
           <a:prstGeom prst="rect">
@@ -4732,7 +4732,7 @@
         </p:blipFill>
         <p:spPr>
           <a:xfrm>
-            <a:off x="6944730" y="659223"/>
+            <a:off x="6944730" y="155793"/>
             <a:ext cx="641466" cy="619089"/>
           </a:xfrm>
           <a:prstGeom prst="rect">
@@ -4891,7 +4891,7 @@
         </p:blipFill>
         <p:spPr>
           <a:xfrm>
-            <a:off x="8596264" y="660392"/>
+            <a:off x="8596264" y="156962"/>
             <a:ext cx="641466" cy="619089"/>
           </a:xfrm>
           <a:prstGeom prst="rect">
@@ -5153,7 +5153,7 @@
         </p:blipFill>
         <p:spPr>
           <a:xfrm>
-            <a:off x="9418077" y="659222"/>
+            <a:off x="9418077" y="155792"/>
             <a:ext cx="641466" cy="619089"/>
           </a:xfrm>
           <a:prstGeom prst="rect">
@@ -5178,11 +5178,13 @@
         </p:nvCxnSpPr>
         <p:spPr>
           <a:xfrm rot="16200000" flipV="1">
-            <a:off x="9221873" y="974605"/>
-            <a:ext cx="1197392" cy="1807144"/>
+            <a:off x="8970158" y="722890"/>
+            <a:ext cx="1700822" cy="1807144"/>
           </a:xfrm>
           <a:prstGeom prst="bentConnector3">
-            <a:avLst/>
+            <a:avLst>
+              <a:gd name="adj1" fmla="val 74767"/>
+            </a:avLst>
           </a:prstGeom>
           <a:ln w="38100">
             <a:solidFill>
@@ -5224,13 +5226,13 @@
         </p:nvCxnSpPr>
         <p:spPr>
           <a:xfrm flipH="1" flipV="1">
-            <a:off x="9738810" y="1278311"/>
-            <a:ext cx="1795457" cy="1934123"/>
+            <a:off x="9738810" y="774881"/>
+            <a:ext cx="1795457" cy="2437553"/>
           </a:xfrm>
           <a:prstGeom prst="bentConnector4">
             <a:avLst>
               <a:gd name="adj1" fmla="val -12732"/>
-              <a:gd name="adj2" fmla="val 84923"/>
+              <a:gd name="adj2" fmla="val 75517"/>
             </a:avLst>
           </a:prstGeom>
           <a:ln w="38100">
@@ -5274,12 +5276,12 @@
         </p:nvCxnSpPr>
         <p:spPr>
           <a:xfrm rot="5400000" flipH="1" flipV="1">
-            <a:off x="5345681" y="1471161"/>
-            <a:ext cx="1194222" cy="808522"/>
+            <a:off x="5093966" y="1219446"/>
+            <a:ext cx="1697652" cy="808522"/>
           </a:xfrm>
           <a:prstGeom prst="bentConnector3">
             <a:avLst>
-              <a:gd name="adj1" fmla="val 50000"/>
+              <a:gd name="adj1" fmla="val 74208"/>
             </a:avLst>
           </a:prstGeom>
           <a:ln w="38100">
@@ -5304,6 +5306,67 @@
           </a:fontRef>
         </p:style>
       </p:cxnSp>
+      <p:sp>
+        <p:nvSpPr>
+          <p:cNvPr id="42" name="Rounded Rectangle 41">
+            <a:extLst>
+              <a:ext uri="{FF2B5EF4-FFF2-40B4-BE49-F238E27FC236}">
+                <a16:creationId xmlns:a16="http://schemas.microsoft.com/office/drawing/2014/main" id="{400D33BB-541D-7B46-B1CD-3B4FF43A0F5B}"/>
+              </a:ext>
+            </a:extLst>
+          </p:cNvPr>
+          <p:cNvSpPr/>
+          <p:nvPr/>
+        </p:nvSpPr>
+        <p:spPr>
+          <a:xfrm>
+            <a:off x="4726800" y="1928224"/>
+            <a:ext cx="1620253" cy="433137"/>
+          </a:xfrm>
+          <a:prstGeom prst="roundRect">
+            <a:avLst/>
+          </a:prstGeom>
+          <a:solidFill>
+            <a:schemeClr val="accent4"/>
+          </a:solidFill>
+        </p:spPr>
+        <p:style>
+          <a:lnRef idx="2">
+            <a:schemeClr val="accent1">
+              <a:shade val="50000"/>
+            </a:schemeClr>
+          </a:lnRef>
+          <a:fillRef idx="1">
+            <a:schemeClr val="accent1"/>
+          </a:fillRef>
+          <a:effectRef idx="0">
+            <a:schemeClr val="accent1"/>
+          </a:effectRef>
+          <a:fontRef idx="minor">
+            <a:schemeClr val="lt1"/>
+          </a:fontRef>
+        </p:style>
+        <p:txBody>
+          <a:bodyPr rtlCol="0" anchor="ctr"/>
+          <a:lstStyle/>
+          <a:p>
+            <a:pPr algn="ctr"/>
+            <a:r>
+              <a:rPr lang="en-US" sz="1400" b="1" i="1" dirty="0" err="1">
+                <a:solidFill>
+                  <a:schemeClr val="tx1"/>
+                </a:solidFill>
+              </a:rPr>
+              <a:t>Kubecost</a:t>
+            </a:r>
+            <a:endParaRPr lang="en-US" sz="1400" b="1" i="1" dirty="0">
+              <a:solidFill>
+                <a:schemeClr val="tx1"/>
+              </a:solidFill>
+            </a:endParaRPr>
+          </a:p>
+        </p:txBody>
+      </p:sp>
     </p:spTree>
     <p:extLst>
       <p:ext uri="{BB962C8B-B14F-4D97-AF65-F5344CB8AC3E}">

</xml_diff>